<commit_message>
Update Guia de Orientacao do Preenchimento da Planilha OBM_HÓRUS.pptx
</commit_message>
<xml_diff>
--- a/Entregaveis/1.RepositorioSemantico/Terminologias/OBM/Guia de Orientacao do Preenchimento da Planilha OBM_HÓRUS.pptx
+++ b/Entregaveis/1.RepositorioSemantico/Terminologias/OBM/Guia de Orientacao do Preenchimento da Planilha OBM_HÓRUS.pptx
@@ -3659,10 +3659,10 @@
                 <a:ea typeface="Verdana" charset="0"/>
                 <a:cs typeface="Verdana" charset="0"/>
               </a:rPr>
-              <a:t> </a:t>
-            </a:r>
-            <a:r>
-              <a:rPr lang="en-US" dirty="0" smtClean="0">
+              <a:t> do </a:t>
+            </a:r>
+            <a:r>
+              <a:rPr lang="en-US" dirty="0" err="1">
                 <a:solidFill>
                   <a:schemeClr val="bg1"/>
                 </a:solidFill>
@@ -3670,10 +3670,10 @@
                 <a:ea typeface="Verdana" charset="0"/>
                 <a:cs typeface="Verdana" charset="0"/>
               </a:rPr>
-              <a:t>do </a:t>
-            </a:r>
-            <a:r>
-              <a:rPr lang="en-US" dirty="0" err="1">
+              <a:t>p</a:t>
+            </a:r>
+            <a:r>
+              <a:rPr lang="en-US" dirty="0" err="1" smtClean="0">
                 <a:solidFill>
                   <a:schemeClr val="bg1"/>
                 </a:solidFill>
@@ -3681,10 +3681,10 @@
                 <a:ea typeface="Verdana" charset="0"/>
                 <a:cs typeface="Verdana" charset="0"/>
               </a:rPr>
-              <a:t>p</a:t>
-            </a:r>
-            <a:r>
-              <a:rPr lang="en-US" dirty="0" err="1" smtClean="0">
+              <a:t>reenchimento</a:t>
+            </a:r>
+            <a:r>
+              <a:rPr lang="en-US" dirty="0" smtClean="0">
                 <a:solidFill>
                   <a:schemeClr val="bg1"/>
                 </a:solidFill>
@@ -3692,10 +3692,10 @@
                 <a:ea typeface="Verdana" charset="0"/>
                 <a:cs typeface="Verdana" charset="0"/>
               </a:rPr>
-              <a:t>reenchimento</a:t>
-            </a:r>
-            <a:r>
-              <a:rPr lang="en-US" dirty="0" smtClean="0">
+              <a:t> da </a:t>
+            </a:r>
+            <a:r>
+              <a:rPr lang="en-US" dirty="0" err="1" smtClean="0">
                 <a:solidFill>
                   <a:schemeClr val="bg1"/>
                 </a:solidFill>
@@ -3703,10 +3703,10 @@
                 <a:ea typeface="Verdana" charset="0"/>
                 <a:cs typeface="Verdana" charset="0"/>
               </a:rPr>
-              <a:t> da </a:t>
-            </a:r>
-            <a:r>
-              <a:rPr lang="en-US" dirty="0" err="1" smtClean="0">
+              <a:t>planilha</a:t>
+            </a:r>
+            <a:r>
+              <a:rPr lang="en-US" dirty="0" smtClean="0">
                 <a:solidFill>
                   <a:schemeClr val="bg1"/>
                 </a:solidFill>
@@ -3714,29 +3714,7 @@
                 <a:ea typeface="Verdana" charset="0"/>
                 <a:cs typeface="Verdana" charset="0"/>
               </a:rPr>
-              <a:t>planilha</a:t>
-            </a:r>
-            <a:r>
-              <a:rPr lang="en-US" dirty="0" smtClean="0">
-                <a:solidFill>
-                  <a:schemeClr val="bg1"/>
-                </a:solidFill>
-                <a:latin typeface="Verdana" charset="0"/>
-                <a:ea typeface="Verdana" charset="0"/>
-                <a:cs typeface="Verdana" charset="0"/>
-              </a:rPr>
-              <a:t> </a:t>
-            </a:r>
-            <a:r>
-              <a:rPr lang="en-US" dirty="0" smtClean="0">
-                <a:solidFill>
-                  <a:schemeClr val="bg1"/>
-                </a:solidFill>
-                <a:latin typeface="Verdana" charset="0"/>
-                <a:ea typeface="Verdana" charset="0"/>
-                <a:cs typeface="Verdana" charset="0"/>
-              </a:rPr>
-              <a:t>OBM_HÓRUS</a:t>
+              <a:t> OBM_HÓRUS</a:t>
             </a:r>
             <a:endParaRPr lang="en-US" dirty="0">
               <a:solidFill>
@@ -4667,7 +4645,11 @@
             </a:r>
             <a:r>
               <a:rPr lang="en-US" kern="1200" dirty="0" smtClean="0"/>
-              <a:t> da OBM</a:t>
+              <a:t> da </a:t>
+            </a:r>
+            <a:r>
+              <a:rPr lang="en-US" kern="1200" dirty="0" smtClean="0"/>
+              <a:t>OBM?</a:t>
             </a:r>
             <a:endParaRPr lang="en-US" kern="1200" dirty="0"/>
           </a:p>
@@ -5201,7 +5183,11 @@
             </a:r>
             <a:r>
               <a:rPr lang="en-US" kern="1200" dirty="0" smtClean="0"/>
-              <a:t> da OBM</a:t>
+              <a:t> da </a:t>
+            </a:r>
+            <a:r>
+              <a:rPr lang="en-US" kern="1200" dirty="0" smtClean="0"/>
+              <a:t>OBM?</a:t>
             </a:r>
             <a:endParaRPr lang="en-US" kern="1200" dirty="0"/>
           </a:p>
@@ -5215,8 +5201,8 @@
         </p:nvSpPr>
         <p:spPr>
           <a:xfrm>
-            <a:off x="403123" y="1897625"/>
-            <a:ext cx="11454580" cy="3416320"/>
+            <a:off x="403123" y="1692517"/>
+            <a:ext cx="11454580" cy="5078313"/>
           </a:xfrm>
           <a:prstGeom prst="rect">
             <a:avLst/>
@@ -5513,8 +5499,20 @@
                   </a:schemeClr>
                 </a:solidFill>
               </a:rPr>
-              <a:t>CMED_22023109.</a:t>
-            </a:r>
+              <a:t>CMED_22023109</a:t>
+            </a:r>
+            <a:r>
+              <a:rPr lang="pt-BR" dirty="0" smtClean="0">
+                <a:solidFill>
+                  <a:schemeClr val="bg2">
+                    <a:lumMod val="10000"/>
+                  </a:schemeClr>
+                </a:solidFill>
+              </a:rPr>
+              <a:t>.</a:t>
+            </a:r>
+          </a:p>
+          <a:p>
             <a:endParaRPr lang="pt-BR" dirty="0">
               <a:solidFill>
                 <a:schemeClr val="bg2">
@@ -5524,6 +5522,151 @@
             </a:endParaRPr>
           </a:p>
           <a:p>
+            <a:r>
+              <a:rPr lang="pt-BR" dirty="0" smtClean="0">
+                <a:solidFill>
+                  <a:srgbClr val="FF0000"/>
+                </a:solidFill>
+              </a:rPr>
+              <a:t>Observação:</a:t>
+            </a:r>
+            <a:r>
+              <a:rPr lang="pt-BR" dirty="0" smtClean="0">
+                <a:solidFill>
+                  <a:schemeClr val="bg2">
+                    <a:lumMod val="10000"/>
+                  </a:schemeClr>
+                </a:solidFill>
+              </a:rPr>
+              <a:t> Colunas que podem ser mescladas para facilitar o preenchimento e também ajudar no monitoramento: </a:t>
+            </a:r>
+          </a:p>
+          <a:p>
+            <a:pPr marL="285750" indent="-285750">
+              <a:buFont typeface="Arial" panose="020B0604020202020204" pitchFamily="34" charset="0"/>
+              <a:buChar char="•"/>
+            </a:pPr>
+            <a:r>
+              <a:rPr lang="pt-BR" dirty="0" smtClean="0">
+                <a:solidFill>
+                  <a:schemeClr val="bg2">
+                    <a:lumMod val="10000"/>
+                  </a:schemeClr>
+                </a:solidFill>
+              </a:rPr>
+              <a:t>colunas </a:t>
+            </a:r>
+            <a:r>
+              <a:rPr lang="pt-BR" dirty="0">
+                <a:solidFill>
+                  <a:schemeClr val="bg2">
+                    <a:lumMod val="10000"/>
+                  </a:schemeClr>
+                </a:solidFill>
+              </a:rPr>
+              <a:t>B (TOTAL) e C (MEDICAMENTO (LISTA HÓRUS</a:t>
+            </a:r>
+            <a:r>
+              <a:rPr lang="pt-BR" dirty="0" smtClean="0">
+                <a:solidFill>
+                  <a:schemeClr val="bg2">
+                    <a:lumMod val="10000"/>
+                  </a:schemeClr>
+                </a:solidFill>
+              </a:rPr>
+              <a:t>));</a:t>
+            </a:r>
+          </a:p>
+          <a:p>
+            <a:pPr marL="285750" indent="-285750">
+              <a:buFont typeface="Arial" panose="020B0604020202020204" pitchFamily="34" charset="0"/>
+              <a:buChar char="•"/>
+            </a:pPr>
+            <a:r>
+              <a:rPr lang="pt-BR" dirty="0" smtClean="0">
+                <a:solidFill>
+                  <a:schemeClr val="bg2">
+                    <a:lumMod val="10000"/>
+                  </a:schemeClr>
+                </a:solidFill>
+              </a:rPr>
+              <a:t>colunas </a:t>
+            </a:r>
+            <a:r>
+              <a:rPr lang="pt-BR" dirty="0">
+                <a:solidFill>
+                  <a:schemeClr val="bg2">
+                    <a:lumMod val="10000"/>
+                  </a:schemeClr>
+                </a:solidFill>
+              </a:rPr>
+              <a:t>J (OBM – VTM (SIM OU NÃO)) e K (SUBSTÂNCIA (VTM</a:t>
+            </a:r>
+            <a:r>
+              <a:rPr lang="pt-BR" dirty="0" smtClean="0">
+                <a:solidFill>
+                  <a:schemeClr val="bg2">
+                    <a:lumMod val="10000"/>
+                  </a:schemeClr>
+                </a:solidFill>
+              </a:rPr>
+              <a:t>));</a:t>
+            </a:r>
+          </a:p>
+          <a:p>
+            <a:pPr marL="285750" indent="-285750">
+              <a:buFont typeface="Arial" panose="020B0604020202020204" pitchFamily="34" charset="0"/>
+              <a:buChar char="•"/>
+            </a:pPr>
+            <a:r>
+              <a:rPr lang="pt-BR" dirty="0">
+                <a:solidFill>
+                  <a:schemeClr val="bg2">
+                    <a:lumMod val="10000"/>
+                  </a:schemeClr>
+                </a:solidFill>
+              </a:rPr>
+              <a:t>c</a:t>
+            </a:r>
+            <a:r>
+              <a:rPr lang="pt-BR" dirty="0" smtClean="0">
+                <a:solidFill>
+                  <a:schemeClr val="bg2">
+                    <a:lumMod val="10000"/>
+                  </a:schemeClr>
+                </a:solidFill>
+              </a:rPr>
+              <a:t>oluna P (VMP);</a:t>
+            </a:r>
+          </a:p>
+          <a:p>
+            <a:endParaRPr lang="pt-BR" dirty="0">
+              <a:solidFill>
+                <a:schemeClr val="bg2">
+                  <a:lumMod val="10000"/>
+                </a:schemeClr>
+              </a:solidFill>
+            </a:endParaRPr>
+          </a:p>
+          <a:p>
+            <a:r>
+              <a:rPr lang="pt-BR" dirty="0" smtClean="0">
+                <a:solidFill>
+                  <a:srgbClr val="FF0000"/>
+                </a:solidFill>
+              </a:rPr>
+              <a:t>*NÃO</a:t>
+            </a:r>
+            <a:r>
+              <a:rPr lang="pt-BR" dirty="0" smtClean="0">
+                <a:solidFill>
+                  <a:schemeClr val="bg2">
+                    <a:lumMod val="10000"/>
+                  </a:schemeClr>
+                </a:solidFill>
+              </a:rPr>
+              <a:t> mesclar a coluna A (DATA).</a:t>
+            </a:r>
             <a:endParaRPr lang="pt-BR" dirty="0" smtClean="0"/>
           </a:p>
           <a:p>
@@ -7979,6 +8122,24 @@
 </file>
 
 <file path=customXml/item1.xml><?xml version="1.0" encoding="utf-8"?>
+<p:properties xmlns:p="http://schemas.microsoft.com/office/2006/metadata/properties" xmlns:xsi="http://www.w3.org/2001/XMLSchema-instance" xmlns:pc="http://schemas.microsoft.com/office/infopath/2007/PartnerControls">
+  <documentManagement>
+    <PublishingExpirationDate xmlns="http://schemas.microsoft.com/sharepoint/v3" xsi:nil="true"/>
+    <PublishingStartDate xmlns="http://schemas.microsoft.com/sharepoint/v3" xsi:nil="true"/>
+  </documentManagement>
+</p:properties>
+</file>
+
+<file path=customXml/item2.xml><?xml version="1.0" encoding="utf-8"?>
+<?mso-contentType ?>
+<FormTemplates xmlns="http://schemas.microsoft.com/sharepoint/v3/contenttype/forms">
+  <Display>DocumentLibraryForm</Display>
+  <Edit>DocumentLibraryForm</Edit>
+  <New>DocumentLibraryForm</New>
+</FormTemplates>
+</file>
+
+<file path=customXml/item3.xml><?xml version="1.0" encoding="utf-8"?>
 <ct:contentTypeSchema xmlns:ct="http://schemas.microsoft.com/office/2006/metadata/contentType" xmlns:ma="http://schemas.microsoft.com/office/2006/metadata/properties/metaAttributes" ct:_="" ma:_="" ma:contentTypeName="Documento" ma:contentTypeID="0x010100723D2CAF8F6D454386B6D2F8A0DCF231" ma:contentTypeVersion="2" ma:contentTypeDescription="Crie um novo documento." ma:contentTypeScope="" ma:versionID="c0858f29dd66d52c8696a7587490b468">
   <xsd:schema xmlns:xsd="http://www.w3.org/2001/XMLSchema" xmlns:xs="http://www.w3.org/2001/XMLSchema" xmlns:p="http://schemas.microsoft.com/office/2006/metadata/properties" xmlns:ns1="http://schemas.microsoft.com/sharepoint/v3" targetNamespace="http://schemas.microsoft.com/office/2006/metadata/properties" ma:root="true" ma:fieldsID="b1e67541914f58e7f62cd871ab279784" ns1:_="">
     <xsd:import namespace="http://schemas.microsoft.com/sharepoint/v3"/>
@@ -8110,25 +8271,31 @@
 </ct:contentTypeSchema>
 </file>
 
-<file path=customXml/item2.xml><?xml version="1.0" encoding="utf-8"?>
-<?mso-contentType ?>
-<FormTemplates xmlns="http://schemas.microsoft.com/sharepoint/v3/contenttype/forms">
-  <Display>DocumentLibraryForm</Display>
-  <Edit>DocumentLibraryForm</Edit>
-  <New>DocumentLibraryForm</New>
-</FormTemplates>
+<file path=customXml/itemProps1.xml><?xml version="1.0" encoding="utf-8"?>
+<ds:datastoreItem xmlns:ds="http://schemas.openxmlformats.org/officeDocument/2006/customXml" ds:itemID="{5F17BE90-3239-45E4-8E7C-04C1ECDC6112}">
+  <ds:schemaRefs>
+    <ds:schemaRef ds:uri="http://schemas.openxmlformats.org/package/2006/metadata/core-properties"/>
+    <ds:schemaRef ds:uri="http://purl.org/dc/terms/"/>
+    <ds:schemaRef ds:uri="http://www.w3.org/XML/1998/namespace"/>
+    <ds:schemaRef ds:uri="http://purl.org/dc/dcmitype/"/>
+    <ds:schemaRef ds:uri="http://schemas.microsoft.com/sharepoint/v3"/>
+    <ds:schemaRef ds:uri="http://schemas.microsoft.com/office/2006/metadata/properties"/>
+    <ds:schemaRef ds:uri="http://schemas.microsoft.com/office/2006/documentManagement/types"/>
+    <ds:schemaRef ds:uri="http://schemas.microsoft.com/office/infopath/2007/PartnerControls"/>
+    <ds:schemaRef ds:uri="http://purl.org/dc/elements/1.1/"/>
+  </ds:schemaRefs>
+</ds:datastoreItem>
 </file>
 
-<file path=customXml/item3.xml><?xml version="1.0" encoding="utf-8"?>
-<p:properties xmlns:p="http://schemas.microsoft.com/office/2006/metadata/properties" xmlns:xsi="http://www.w3.org/2001/XMLSchema-instance" xmlns:pc="http://schemas.microsoft.com/office/infopath/2007/PartnerControls">
-  <documentManagement>
-    <PublishingExpirationDate xmlns="http://schemas.microsoft.com/sharepoint/v3" xsi:nil="true"/>
-    <PublishingStartDate xmlns="http://schemas.microsoft.com/sharepoint/v3" xsi:nil="true"/>
-  </documentManagement>
-</p:properties>
+<file path=customXml/itemProps2.xml><?xml version="1.0" encoding="utf-8"?>
+<ds:datastoreItem xmlns:ds="http://schemas.openxmlformats.org/officeDocument/2006/customXml" ds:itemID="{F6787597-DDBA-41B4-A0C3-4E2D2241CA34}">
+  <ds:schemaRefs>
+    <ds:schemaRef ds:uri="http://schemas.microsoft.com/sharepoint/v3/contenttype/forms"/>
+  </ds:schemaRefs>
+</ds:datastoreItem>
 </file>
 
-<file path=customXml/itemProps1.xml><?xml version="1.0" encoding="utf-8"?>
+<file path=customXml/itemProps3.xml><?xml version="1.0" encoding="utf-8"?>
 <ds:datastoreItem xmlns:ds="http://schemas.openxmlformats.org/officeDocument/2006/customXml" ds:itemID="{C4046F3B-6BA2-4AF8-9DF3-38A821388055}">
   <ds:schemaRefs>
     <ds:schemaRef ds:uri="http://schemas.microsoft.com/office/2006/metadata/contentType"/>
@@ -8144,28 +8311,4 @@
     <ds:schemaRef ds:uri="http://schemas.microsoft.com/internal/obd"/>
   </ds:schemaRefs>
 </ds:datastoreItem>
-</file>
-
-<file path=customXml/itemProps2.xml><?xml version="1.0" encoding="utf-8"?>
-<ds:datastoreItem xmlns:ds="http://schemas.openxmlformats.org/officeDocument/2006/customXml" ds:itemID="{F6787597-DDBA-41B4-A0C3-4E2D2241CA34}">
-  <ds:schemaRefs>
-    <ds:schemaRef ds:uri="http://schemas.microsoft.com/sharepoint/v3/contenttype/forms"/>
-  </ds:schemaRefs>
-</ds:datastoreItem>
-</file>
-
-<file path=customXml/itemProps3.xml><?xml version="1.0" encoding="utf-8"?>
-<ds:datastoreItem xmlns:ds="http://schemas.openxmlformats.org/officeDocument/2006/customXml" ds:itemID="{5F17BE90-3239-45E4-8E7C-04C1ECDC6112}">
-  <ds:schemaRefs>
-    <ds:schemaRef ds:uri="http://schemas.openxmlformats.org/package/2006/metadata/core-properties"/>
-    <ds:schemaRef ds:uri="http://purl.org/dc/terms/"/>
-    <ds:schemaRef ds:uri="http://www.w3.org/XML/1998/namespace"/>
-    <ds:schemaRef ds:uri="http://purl.org/dc/dcmitype/"/>
-    <ds:schemaRef ds:uri="http://schemas.microsoft.com/sharepoint/v3"/>
-    <ds:schemaRef ds:uri="http://schemas.microsoft.com/office/2006/metadata/properties"/>
-    <ds:schemaRef ds:uri="http://schemas.microsoft.com/office/2006/documentManagement/types"/>
-    <ds:schemaRef ds:uri="http://schemas.microsoft.com/office/infopath/2007/PartnerControls"/>
-    <ds:schemaRef ds:uri="http://purl.org/dc/elements/1.1/"/>
-  </ds:schemaRefs>
-</ds:datastoreItem>
 </file>
</xml_diff>